<commit_message>
Added Xilinx resource link
More resources.
</commit_message>
<xml_diff>
--- a/slides/OpenCL_on_FPGAs.pptx
+++ b/slides/OpenCL_on_FPGAs.pptx
@@ -4000,11 +4000,7 @@
             </a:r>
             <a:r>
               <a:rPr lang="en-GB" dirty="0" smtClean="0"/>
-              <a:t>deepest </a:t>
-            </a:r>
-            <a:r>
-              <a:rPr lang="en-GB" smtClean="0"/>
-              <a:t>scope possible </a:t>
+              <a:t>deepest scope possible </a:t>
             </a:r>
             <a:endParaRPr lang="en-GB" dirty="0"/>
           </a:p>
@@ -4170,7 +4166,9 @@
         </p:nvSpPr>
         <p:spPr/>
         <p:txBody>
-          <a:bodyPr/>
+          <a:bodyPr>
+            <a:normAutofit fontScale="92500" lnSpcReduction="10000"/>
+          </a:bodyPr>
           <a:lstStyle/>
           <a:p>
             <a:pPr marL="0" indent="0">
@@ -4226,6 +4224,31 @@
             <a:endParaRPr lang="en-GB" dirty="0" smtClean="0"/>
           </a:p>
           <a:p>
+            <a:pPr marL="0" indent="0">
+              <a:buNone/>
+            </a:pPr>
+            <a:r>
+              <a:rPr lang="en-GB" dirty="0" smtClean="0"/>
+              <a:t>Xilinx:</a:t>
+            </a:r>
+          </a:p>
+          <a:p>
+            <a:r>
+              <a:rPr lang="en-GB" dirty="0">
+                <a:hlinkClick r:id="rId4"/>
+              </a:rPr>
+              <a:t>http://www.xilinx.com/products/design-tools/software-zone/sdaccel.html#</a:t>
+            </a:r>
+            <a:r>
+              <a:rPr lang="en-GB" dirty="0" smtClean="0">
+                <a:hlinkClick r:id="rId4"/>
+              </a:rPr>
+              <a:t>documentation</a:t>
+            </a:r>
+            <a:r>
+              <a:rPr lang="en-GB" dirty="0" smtClean="0"/>
+              <a:t> </a:t>
+            </a:r>
             <a:endParaRPr lang="en-GB" dirty="0"/>
           </a:p>
         </p:txBody>

</xml_diff>